<commit_message>
corrected: added links and authors
</commit_message>
<xml_diff>
--- a/docs/First_stage_presentation.pptx
+++ b/docs/First_stage_presentation.pptx
@@ -771,7 +771,8 @@
           <a:p>
             <a:fld id="{0BD23A13-EA63-4D56-B6C2-D24A77A4A947}" type="datetimeFigureOut">
               <a:rPr lang="ru-RU" smtClean="0"/>
-              <a:t>25.10.2017</a:t>
+              <a:pPr/>
+              <a:t>26.10.2017</a:t>
             </a:fld>
             <a:endParaRPr lang="ru-RU"/>
           </a:p>
@@ -831,6 +832,7 @@
           <a:p>
             <a:fld id="{093640D2-F784-4CA3-96B3-F25811C094F8}" type="slidenum">
               <a:rPr lang="ru-RU" smtClean="0"/>
+              <a:pPr/>
               <a:t>‹#›</a:t>
             </a:fld>
             <a:endParaRPr lang="ru-RU"/>
@@ -954,7 +956,8 @@
           <a:p>
             <a:fld id="{0BD23A13-EA63-4D56-B6C2-D24A77A4A947}" type="datetimeFigureOut">
               <a:rPr lang="ru-RU" smtClean="0"/>
-              <a:t>25.10.2017</a:t>
+              <a:pPr/>
+              <a:t>26.10.2017</a:t>
             </a:fld>
             <a:endParaRPr lang="ru-RU"/>
           </a:p>
@@ -996,6 +999,7 @@
           <a:p>
             <a:fld id="{093640D2-F784-4CA3-96B3-F25811C094F8}" type="slidenum">
               <a:rPr lang="ru-RU" smtClean="0"/>
+              <a:pPr/>
               <a:t>‹#›</a:t>
             </a:fld>
             <a:endParaRPr lang="ru-RU"/>
@@ -1129,7 +1133,8 @@
           <a:p>
             <a:fld id="{0BD23A13-EA63-4D56-B6C2-D24A77A4A947}" type="datetimeFigureOut">
               <a:rPr lang="ru-RU" smtClean="0"/>
-              <a:t>25.10.2017</a:t>
+              <a:pPr/>
+              <a:t>26.10.2017</a:t>
             </a:fld>
             <a:endParaRPr lang="ru-RU"/>
           </a:p>
@@ -1171,6 +1176,7 @@
           <a:p>
             <a:fld id="{093640D2-F784-4CA3-96B3-F25811C094F8}" type="slidenum">
               <a:rPr lang="ru-RU" smtClean="0"/>
+              <a:pPr/>
               <a:t>‹#›</a:t>
             </a:fld>
             <a:endParaRPr lang="ru-RU"/>
@@ -1294,7 +1300,8 @@
           <a:p>
             <a:fld id="{0BD23A13-EA63-4D56-B6C2-D24A77A4A947}" type="datetimeFigureOut">
               <a:rPr lang="ru-RU" smtClean="0"/>
-              <a:t>25.10.2017</a:t>
+              <a:pPr/>
+              <a:t>26.10.2017</a:t>
             </a:fld>
             <a:endParaRPr lang="ru-RU"/>
           </a:p>
@@ -1336,6 +1343,7 @@
           <a:p>
             <a:fld id="{093640D2-F784-4CA3-96B3-F25811C094F8}" type="slidenum">
               <a:rPr lang="ru-RU" smtClean="0"/>
+              <a:pPr/>
               <a:t>‹#›</a:t>
             </a:fld>
             <a:endParaRPr lang="ru-RU"/>
@@ -1515,7 +1523,8 @@
           <a:p>
             <a:fld id="{0BD23A13-EA63-4D56-B6C2-D24A77A4A947}" type="datetimeFigureOut">
               <a:rPr lang="ru-RU" smtClean="0"/>
-              <a:t>25.10.2017</a:t>
+              <a:pPr/>
+              <a:t>26.10.2017</a:t>
             </a:fld>
             <a:endParaRPr lang="ru-RU"/>
           </a:p>
@@ -1557,6 +1566,7 @@
           <a:p>
             <a:fld id="{093640D2-F784-4CA3-96B3-F25811C094F8}" type="slidenum">
               <a:rPr lang="ru-RU" smtClean="0"/>
+              <a:pPr/>
               <a:t>‹#›</a:t>
             </a:fld>
             <a:endParaRPr lang="ru-RU"/>
@@ -1774,7 +1784,8 @@
           <a:p>
             <a:fld id="{0BD23A13-EA63-4D56-B6C2-D24A77A4A947}" type="datetimeFigureOut">
               <a:rPr lang="ru-RU" smtClean="0"/>
-              <a:t>25.10.2017</a:t>
+              <a:pPr/>
+              <a:t>26.10.2017</a:t>
             </a:fld>
             <a:endParaRPr lang="ru-RU"/>
           </a:p>
@@ -1816,6 +1827,7 @@
           <a:p>
             <a:fld id="{093640D2-F784-4CA3-96B3-F25811C094F8}" type="slidenum">
               <a:rPr lang="ru-RU" smtClean="0"/>
+              <a:pPr/>
               <a:t>‹#›</a:t>
             </a:fld>
             <a:endParaRPr lang="ru-RU"/>
@@ -2178,7 +2190,8 @@
           <a:p>
             <a:fld id="{0BD23A13-EA63-4D56-B6C2-D24A77A4A947}" type="datetimeFigureOut">
               <a:rPr lang="ru-RU" smtClean="0"/>
-              <a:t>25.10.2017</a:t>
+              <a:pPr/>
+              <a:t>26.10.2017</a:t>
             </a:fld>
             <a:endParaRPr lang="ru-RU"/>
           </a:p>
@@ -2201,6 +2214,7 @@
           <a:p>
             <a:fld id="{093640D2-F784-4CA3-96B3-F25811C094F8}" type="slidenum">
               <a:rPr lang="ru-RU" smtClean="0"/>
+              <a:pPr/>
               <a:t>‹#›</a:t>
             </a:fld>
             <a:endParaRPr lang="ru-RU"/>
@@ -2309,7 +2323,8 @@
           <a:p>
             <a:fld id="{0BD23A13-EA63-4D56-B6C2-D24A77A4A947}" type="datetimeFigureOut">
               <a:rPr lang="ru-RU" smtClean="0"/>
-              <a:t>25.10.2017</a:t>
+              <a:pPr/>
+              <a:t>26.10.2017</a:t>
             </a:fld>
             <a:endParaRPr lang="ru-RU"/>
           </a:p>
@@ -2361,6 +2376,7 @@
           <a:p>
             <a:fld id="{093640D2-F784-4CA3-96B3-F25811C094F8}" type="slidenum">
               <a:rPr lang="ru-RU" smtClean="0"/>
+              <a:pPr/>
               <a:t>‹#›</a:t>
             </a:fld>
             <a:endParaRPr lang="ru-RU"/>
@@ -2409,7 +2425,8 @@
           <a:p>
             <a:fld id="{0BD23A13-EA63-4D56-B6C2-D24A77A4A947}" type="datetimeFigureOut">
               <a:rPr lang="ru-RU" smtClean="0"/>
-              <a:t>25.10.2017</a:t>
+              <a:pPr/>
+              <a:t>26.10.2017</a:t>
             </a:fld>
             <a:endParaRPr lang="ru-RU"/>
           </a:p>
@@ -2451,6 +2468,7 @@
           <a:p>
             <a:fld id="{093640D2-F784-4CA3-96B3-F25811C094F8}" type="slidenum">
               <a:rPr lang="ru-RU" smtClean="0"/>
+              <a:pPr/>
               <a:t>‹#›</a:t>
             </a:fld>
             <a:endParaRPr lang="ru-RU"/>
@@ -2654,7 +2672,8 @@
           <a:p>
             <a:fld id="{0BD23A13-EA63-4D56-B6C2-D24A77A4A947}" type="datetimeFigureOut">
               <a:rPr lang="ru-RU" smtClean="0"/>
-              <a:t>25.10.2017</a:t>
+              <a:pPr/>
+              <a:t>26.10.2017</a:t>
             </a:fld>
             <a:endParaRPr lang="ru-RU"/>
           </a:p>
@@ -2696,6 +2715,7 @@
           <a:p>
             <a:fld id="{093640D2-F784-4CA3-96B3-F25811C094F8}" type="slidenum">
               <a:rPr lang="ru-RU" smtClean="0"/>
+              <a:pPr/>
               <a:t>‹#›</a:t>
             </a:fld>
             <a:endParaRPr lang="ru-RU"/>
@@ -2898,7 +2918,8 @@
           <a:p>
             <a:fld id="{0BD23A13-EA63-4D56-B6C2-D24A77A4A947}" type="datetimeFigureOut">
               <a:rPr lang="ru-RU" smtClean="0"/>
-              <a:t>25.10.2017</a:t>
+              <a:pPr/>
+              <a:t>26.10.2017</a:t>
             </a:fld>
             <a:endParaRPr lang="ru-RU"/>
           </a:p>
@@ -2940,6 +2961,7 @@
           <a:p>
             <a:fld id="{093640D2-F784-4CA3-96B3-F25811C094F8}" type="slidenum">
               <a:rPr lang="ru-RU" smtClean="0"/>
+              <a:pPr/>
               <a:t>‹#›</a:t>
             </a:fld>
             <a:endParaRPr lang="ru-RU"/>
@@ -3722,7 +3744,8 @@
           <a:p>
             <a:fld id="{0BD23A13-EA63-4D56-B6C2-D24A77A4A947}" type="datetimeFigureOut">
               <a:rPr lang="ru-RU" smtClean="0"/>
-              <a:t>25.10.2017</a:t>
+              <a:pPr/>
+              <a:t>26.10.2017</a:t>
             </a:fld>
             <a:endParaRPr lang="ru-RU"/>
           </a:p>
@@ -3796,6 +3819,7 @@
           <a:p>
             <a:fld id="{093640D2-F784-4CA3-96B3-F25811C094F8}" type="slidenum">
               <a:rPr lang="ru-RU" smtClean="0"/>
+              <a:pPr/>
               <a:t>‹#›</a:t>
             </a:fld>
             <a:endParaRPr lang="ru-RU"/>
@@ -4178,8 +4202,211 @@
           <a:p>
             <a:r>
               <a:rPr lang="ru-RU" b="1" dirty="0" smtClean="0"/>
-              <a:t>Презентация окончания этапа</a:t>
-            </a:r>
+              <a:t>Презентация окончания </a:t>
+            </a:r>
+            <a:r>
+              <a:rPr lang="ru-RU" b="1" dirty="0" smtClean="0"/>
+              <a:t>второго </a:t>
+            </a:r>
+            <a:r>
+              <a:rPr lang="ru-RU" b="1" dirty="0" smtClean="0"/>
+              <a:t>этапа</a:t>
+            </a:r>
+            <a:endParaRPr lang="ru-RU" b="1" dirty="0" smtClean="0"/>
+          </a:p>
+        </p:txBody>
+      </p:sp>
+      <p:sp>
+        <p:nvSpPr>
+          <p:cNvPr id="4" name="Подзаголовок 2"/>
+          <p:cNvSpPr txBox="1">
+            <a:spLocks/>
+          </p:cNvSpPr>
+          <p:nvPr/>
+        </p:nvSpPr>
+        <p:spPr>
+          <a:xfrm>
+            <a:off x="5508104" y="4221088"/>
+            <a:ext cx="2936776" cy="1752600"/>
+          </a:xfrm>
+          <a:prstGeom prst="rect">
+            <a:avLst/>
+          </a:prstGeom>
+        </p:spPr>
+        <p:txBody>
+          <a:bodyPr vert="horz">
+            <a:normAutofit/>
+          </a:bodyPr>
+          <a:lstStyle/>
+          <a:p>
+            <a:pPr marL="64008" marR="0" lvl="0" indent="0" algn="r" defTabSz="914400" rtl="0" eaLnBrk="1" fontAlgn="auto" latinLnBrk="0" hangingPunct="1">
+              <a:lnSpc>
+                <a:spcPct val="100000"/>
+              </a:lnSpc>
+              <a:spcBef>
+                <a:spcPts val="300"/>
+              </a:spcBef>
+              <a:spcAft>
+                <a:spcPts val="0"/>
+              </a:spcAft>
+              <a:buClr>
+                <a:schemeClr val="accent3"/>
+              </a:buClr>
+              <a:buSzTx/>
+              <a:buFont typeface="Georgia"/>
+              <a:buNone/>
+              <a:tabLst/>
+              <a:defRPr/>
+            </a:pPr>
+            <a:r>
+              <a:rPr kumimoji="0" lang="ru-RU" sz="2400" i="0" u="none" strike="noStrike" kern="1200" cap="none" spc="0" normalizeH="0" baseline="0" noProof="0" dirty="0" smtClean="0">
+                <a:ln>
+                  <a:noFill/>
+                </a:ln>
+                <a:solidFill>
+                  <a:schemeClr val="tx2"/>
+                </a:solidFill>
+                <a:effectLst/>
+                <a:uLnTx/>
+                <a:uFillTx/>
+                <a:latin typeface="+mn-lt"/>
+                <a:ea typeface="+mn-ea"/>
+                <a:cs typeface="+mn-cs"/>
+              </a:rPr>
+              <a:t>Гайдук</a:t>
+            </a:r>
+            <a:r>
+              <a:rPr kumimoji="0" lang="ru-RU" sz="2400" i="0" u="none" strike="noStrike" kern="1200" cap="none" spc="0" normalizeH="0" noProof="0" dirty="0" smtClean="0">
+                <a:ln>
+                  <a:noFill/>
+                </a:ln>
+                <a:solidFill>
+                  <a:schemeClr val="tx2"/>
+                </a:solidFill>
+                <a:effectLst/>
+                <a:uLnTx/>
+                <a:uFillTx/>
+                <a:latin typeface="+mn-lt"/>
+                <a:ea typeface="+mn-ea"/>
+                <a:cs typeface="+mn-cs"/>
+              </a:rPr>
+              <a:t> М.А.</a:t>
+            </a:r>
+          </a:p>
+          <a:p>
+            <a:pPr marL="64008" marR="0" lvl="0" indent="0" algn="r" defTabSz="914400" rtl="0" eaLnBrk="1" fontAlgn="auto" latinLnBrk="0" hangingPunct="1">
+              <a:lnSpc>
+                <a:spcPct val="100000"/>
+              </a:lnSpc>
+              <a:spcBef>
+                <a:spcPts val="300"/>
+              </a:spcBef>
+              <a:spcAft>
+                <a:spcPts val="0"/>
+              </a:spcAft>
+              <a:buClr>
+                <a:schemeClr val="accent3"/>
+              </a:buClr>
+              <a:buSzTx/>
+              <a:buFont typeface="Georgia"/>
+              <a:buNone/>
+              <a:tabLst/>
+              <a:defRPr/>
+            </a:pPr>
+            <a:r>
+              <a:rPr lang="ru-RU" sz="2400" baseline="0" dirty="0" err="1" smtClean="0">
+                <a:solidFill>
+                  <a:schemeClr val="tx2"/>
+                </a:solidFill>
+              </a:rPr>
+              <a:t>Половинкин</a:t>
+            </a:r>
+            <a:r>
+              <a:rPr lang="ru-RU" sz="2400" dirty="0" smtClean="0">
+                <a:solidFill>
+                  <a:schemeClr val="tx2"/>
+                </a:solidFill>
+              </a:rPr>
+              <a:t> А.А.</a:t>
+            </a:r>
+          </a:p>
+          <a:p>
+            <a:pPr marL="64008" marR="0" lvl="0" indent="0" algn="r" defTabSz="914400" rtl="0" eaLnBrk="1" fontAlgn="auto" latinLnBrk="0" hangingPunct="1">
+              <a:lnSpc>
+                <a:spcPct val="100000"/>
+              </a:lnSpc>
+              <a:spcBef>
+                <a:spcPts val="300"/>
+              </a:spcBef>
+              <a:spcAft>
+                <a:spcPts val="0"/>
+              </a:spcAft>
+              <a:buClr>
+                <a:schemeClr val="accent3"/>
+              </a:buClr>
+              <a:buSzTx/>
+              <a:buFont typeface="Georgia"/>
+              <a:buNone/>
+              <a:tabLst/>
+              <a:defRPr/>
+            </a:pPr>
+            <a:endParaRPr kumimoji="0" lang="ru-RU" sz="2400" i="0" u="none" strike="noStrike" kern="1200" cap="none" spc="0" normalizeH="0" baseline="0" noProof="0" dirty="0" smtClean="0">
+              <a:ln>
+                <a:noFill/>
+              </a:ln>
+              <a:solidFill>
+                <a:schemeClr val="tx2"/>
+              </a:solidFill>
+              <a:effectLst/>
+              <a:uLnTx/>
+              <a:uFillTx/>
+              <a:latin typeface="+mn-lt"/>
+              <a:ea typeface="+mn-ea"/>
+              <a:cs typeface="+mn-cs"/>
+            </a:endParaRPr>
+          </a:p>
+          <a:p>
+            <a:pPr marL="64008" marR="0" lvl="0" indent="0" algn="r" defTabSz="914400" rtl="0" eaLnBrk="1" fontAlgn="auto" latinLnBrk="0" hangingPunct="1">
+              <a:lnSpc>
+                <a:spcPct val="100000"/>
+              </a:lnSpc>
+              <a:spcBef>
+                <a:spcPts val="300"/>
+              </a:spcBef>
+              <a:spcAft>
+                <a:spcPts val="0"/>
+              </a:spcAft>
+              <a:buClr>
+                <a:schemeClr val="accent3"/>
+              </a:buClr>
+              <a:buSzTx/>
+              <a:buFont typeface="Georgia"/>
+              <a:buNone/>
+              <a:tabLst/>
+              <a:defRPr/>
+            </a:pPr>
+            <a:r>
+              <a:rPr lang="ru-RU" sz="2400" dirty="0" smtClean="0">
+                <a:solidFill>
+                  <a:schemeClr val="tx2"/>
+                </a:solidFill>
+              </a:rPr>
+              <a:t>группа 5304</a:t>
+            </a:r>
+            <a:endParaRPr kumimoji="0" lang="ru-RU" sz="2400" i="0" u="none" strike="noStrike" kern="1200" cap="none" spc="0" normalizeH="0" baseline="0" noProof="0" dirty="0" smtClean="0">
+              <a:ln>
+                <a:noFill/>
+              </a:ln>
+              <a:solidFill>
+                <a:schemeClr val="tx2"/>
+              </a:solidFill>
+              <a:effectLst/>
+              <a:uLnTx/>
+              <a:uFillTx/>
+              <a:latin typeface="+mn-lt"/>
+              <a:ea typeface="+mn-ea"/>
+              <a:cs typeface="+mn-cs"/>
+            </a:endParaRPr>
           </a:p>
         </p:txBody>
       </p:sp>
@@ -5019,7 +5246,7 @@
         </p:spPr>
         <p:txBody>
           <a:bodyPr>
-            <a:normAutofit lnSpcReduction="10000"/>
+            <a:normAutofit fontScale="77500" lnSpcReduction="20000"/>
           </a:bodyPr>
           <a:lstStyle/>
           <a:p>
@@ -5146,9 +5373,164 @@
               </a:rPr>
               <a:t>.</a:t>
             </a:r>
+            <a:endParaRPr lang="en-US" sz="3000" dirty="0" smtClean="0">
+              <a:solidFill>
+                <a:schemeClr val="tx1"/>
+              </a:solidFill>
+              <a:latin typeface="Calibri" pitchFamily="34" charset="0"/>
+              <a:cs typeface="Calibri" pitchFamily="34" charset="0"/>
+            </a:endParaRPr>
+          </a:p>
+          <a:p>
+            <a:pPr marL="36000" lvl="1" indent="0">
+              <a:lnSpc>
+                <a:spcPct val="150000"/>
+              </a:lnSpc>
+              <a:buNone/>
+            </a:pPr>
+            <a:endParaRPr lang="ru-RU" sz="1200" dirty="0" smtClean="0">
+              <a:solidFill>
+                <a:schemeClr val="tx1"/>
+              </a:solidFill>
+              <a:latin typeface="Calibri" pitchFamily="34" charset="0"/>
+              <a:cs typeface="Calibri" pitchFamily="34" charset="0"/>
+            </a:endParaRPr>
+          </a:p>
+          <a:p>
+            <a:pPr marL="36000" lvl="1" indent="0">
+              <a:lnSpc>
+                <a:spcPct val="150000"/>
+              </a:lnSpc>
+              <a:buNone/>
+            </a:pPr>
+            <a:r>
+              <a:rPr lang="ru-RU" sz="3000" b="1" dirty="0" err="1" smtClean="0">
+                <a:solidFill>
+                  <a:schemeClr val="tx1"/>
+                </a:solidFill>
+                <a:latin typeface="Calibri" pitchFamily="34" charset="0"/>
+                <a:cs typeface="Calibri" pitchFamily="34" charset="0"/>
+              </a:rPr>
+              <a:t>Репозиторий</a:t>
+            </a:r>
+            <a:r>
+              <a:rPr lang="ru-RU" sz="3000" b="1" dirty="0" smtClean="0">
+                <a:solidFill>
+                  <a:schemeClr val="tx1"/>
+                </a:solidFill>
+                <a:latin typeface="Calibri" pitchFamily="34" charset="0"/>
+                <a:cs typeface="Calibri" pitchFamily="34" charset="0"/>
+              </a:rPr>
+              <a:t>:</a:t>
+            </a:r>
+            <a:r>
+              <a:rPr lang="ru-RU" sz="3000" dirty="0" smtClean="0">
+                <a:solidFill>
+                  <a:schemeClr val="tx1"/>
+                </a:solidFill>
+                <a:latin typeface="Calibri" pitchFamily="34" charset="0"/>
+                <a:cs typeface="Calibri" pitchFamily="34" charset="0"/>
+              </a:rPr>
+              <a:t> </a:t>
+            </a:r>
+            <a:r>
+              <a:rPr lang="en-US" dirty="0" smtClean="0">
+                <a:solidFill>
+                  <a:schemeClr val="accent6">
+                    <a:lumMod val="75000"/>
+                  </a:schemeClr>
+                </a:solidFill>
+                <a:latin typeface="Calibri" pitchFamily="34" charset="0"/>
+                <a:cs typeface="Calibri" pitchFamily="34" charset="0"/>
+              </a:rPr>
+              <a:t>https://</a:t>
+            </a:r>
+            <a:r>
+              <a:rPr lang="en-US" dirty="0" smtClean="0">
+                <a:solidFill>
+                  <a:schemeClr val="accent6">
+                    <a:lumMod val="75000"/>
+                  </a:schemeClr>
+                </a:solidFill>
+                <a:latin typeface="Calibri" pitchFamily="34" charset="0"/>
+                <a:cs typeface="Calibri" pitchFamily="34" charset="0"/>
+              </a:rPr>
+              <a:t>github.com/moevm/mse_nosql_tasks_course</a:t>
+            </a:r>
+            <a:endParaRPr lang="ru-RU" sz="3000" dirty="0" smtClean="0">
+              <a:solidFill>
+                <a:schemeClr val="accent6">
+                  <a:lumMod val="75000"/>
+                </a:schemeClr>
+              </a:solidFill>
+              <a:latin typeface="Calibri" pitchFamily="34" charset="0"/>
+              <a:cs typeface="Calibri" pitchFamily="34" charset="0"/>
+            </a:endParaRPr>
+          </a:p>
+          <a:p>
+            <a:pPr marL="36000" lvl="1" indent="0">
+              <a:lnSpc>
+                <a:spcPct val="150000"/>
+              </a:lnSpc>
+              <a:buNone/>
+            </a:pPr>
+            <a:r>
+              <a:rPr lang="ru-RU" sz="3000" b="1" dirty="0" smtClean="0">
+                <a:solidFill>
+                  <a:schemeClr val="tx1"/>
+                </a:solidFill>
+                <a:latin typeface="Calibri" pitchFamily="34" charset="0"/>
+                <a:cs typeface="Calibri" pitchFamily="34" charset="0"/>
+              </a:rPr>
+              <a:t>Курс на </a:t>
+            </a:r>
+            <a:r>
+              <a:rPr lang="en-US" sz="3000" b="1" dirty="0" err="1" smtClean="0">
+                <a:solidFill>
+                  <a:schemeClr val="tx1"/>
+                </a:solidFill>
+                <a:latin typeface="Calibri" pitchFamily="34" charset="0"/>
+                <a:cs typeface="Calibri" pitchFamily="34" charset="0"/>
+              </a:rPr>
+              <a:t>Stepik</a:t>
+            </a:r>
+            <a:r>
+              <a:rPr lang="en-US" sz="3000" b="1" dirty="0" smtClean="0">
+                <a:solidFill>
+                  <a:schemeClr val="tx1"/>
+                </a:solidFill>
+                <a:latin typeface="Calibri" pitchFamily="34" charset="0"/>
+                <a:cs typeface="Calibri" pitchFamily="34" charset="0"/>
+              </a:rPr>
+              <a:t>:</a:t>
+            </a:r>
+            <a:r>
+              <a:rPr lang="en-US" sz="3000" dirty="0" smtClean="0">
+                <a:solidFill>
+                  <a:schemeClr val="tx1"/>
+                </a:solidFill>
+                <a:latin typeface="Calibri" pitchFamily="34" charset="0"/>
+                <a:cs typeface="Calibri" pitchFamily="34" charset="0"/>
+              </a:rPr>
+              <a:t> </a:t>
+            </a:r>
+            <a:r>
+              <a:rPr lang="en-US" dirty="0" smtClean="0">
+                <a:solidFill>
+                  <a:schemeClr val="accent6">
+                    <a:lumMod val="75000"/>
+                  </a:schemeClr>
+                </a:solidFill>
+                <a:latin typeface="Calibri" pitchFamily="34" charset="0"/>
+                <a:cs typeface="Calibri" pitchFamily="34" charset="0"/>
+              </a:rPr>
+              <a:t>https://stepik.org/course/3672</a:t>
+            </a:r>
             <a:endParaRPr lang="ru-RU" sz="3000" dirty="0">
               <a:solidFill>
-                <a:schemeClr val="tx1"/>
+                <a:schemeClr val="accent6">
+                  <a:lumMod val="75000"/>
+                </a:schemeClr>
               </a:solidFill>
               <a:latin typeface="Calibri" pitchFamily="34" charset="0"/>
               <a:cs typeface="Calibri" pitchFamily="34" charset="0"/>

</xml_diff>